<commit_message>
clean up documentation of python infer scripts
</commit_message>
<xml_diff>
--- a/flaskProject/MoDaC Predcitions workflow.pptx
+++ b/flaskProject/MoDaC Predcitions workflow.pptx
@@ -1192,7 +1192,7 @@
       <dgm:spPr/>
     </dgm:pt>
     <dgm:pt modelId="{ED3765C6-FDD5-2547-9776-F6245DD12DF2}" type="pres">
-      <dgm:prSet presAssocID="{4DE11D42-EC79-6343-BEB7-BA07C6AC4141}" presName="sibTrans" presStyleLbl="sibTrans2D1" presStyleIdx="0" presStyleCnt="6"/>
+      <dgm:prSet presAssocID="{4DE11D42-EC79-6343-BEB7-BA07C6AC4141}" presName="sibTrans" presStyleLbl="sibTrans2D1" presStyleIdx="0" presStyleCnt="6" custScaleX="158116"/>
       <dgm:spPr/>
     </dgm:pt>
     <dgm:pt modelId="{E4363DA0-268A-B546-9399-8E17188C7D00}" type="pres">
@@ -1208,7 +1208,7 @@
       <dgm:spPr/>
     </dgm:pt>
     <dgm:pt modelId="{14C1ADFB-40B8-0649-A2ED-1D5CA3C20AEF}" type="pres">
-      <dgm:prSet presAssocID="{982A9C44-7DCD-DC43-B298-69473825AA19}" presName="sibTrans" presStyleLbl="sibTrans2D1" presStyleIdx="1" presStyleCnt="6"/>
+      <dgm:prSet presAssocID="{982A9C44-7DCD-DC43-B298-69473825AA19}" presName="sibTrans" presStyleLbl="sibTrans2D1" presStyleIdx="1" presStyleCnt="6" custScaleX="164751"/>
       <dgm:spPr/>
     </dgm:pt>
     <dgm:pt modelId="{184306BA-DD7B-694F-9319-2EDEF8AF10B4}" type="pres">
@@ -1224,7 +1224,7 @@
       <dgm:spPr/>
     </dgm:pt>
     <dgm:pt modelId="{D18FC3E0-6B0A-D243-ACE1-68FCA72AABDA}" type="pres">
-      <dgm:prSet presAssocID="{E5FDAED9-3032-9644-87AA-8C07BFD6C673}" presName="sibTrans" presStyleLbl="sibTrans2D1" presStyleIdx="2" presStyleCnt="6"/>
+      <dgm:prSet presAssocID="{E5FDAED9-3032-9644-87AA-8C07BFD6C673}" presName="sibTrans" presStyleLbl="sibTrans2D1" presStyleIdx="2" presStyleCnt="6" custAng="114962" custScaleX="152381" custScaleY="133659"/>
       <dgm:spPr/>
     </dgm:pt>
     <dgm:pt modelId="{39E1BB5A-42D5-D84C-B229-DB4B73AD8F35}" type="pres">
@@ -1240,7 +1240,7 @@
       <dgm:spPr/>
     </dgm:pt>
     <dgm:pt modelId="{BCB7E5ED-DFD6-654E-BCB9-68473C0EBF4B}" type="pres">
-      <dgm:prSet presAssocID="{7767698B-D9CA-4D40-B2C9-FABABDE51241}" presName="sibTrans" presStyleLbl="sibTrans2D1" presStyleIdx="3" presStyleCnt="6"/>
+      <dgm:prSet presAssocID="{7767698B-D9CA-4D40-B2C9-FABABDE51241}" presName="sibTrans" presStyleLbl="sibTrans2D1" presStyleIdx="3" presStyleCnt="6" custScaleX="144438"/>
       <dgm:spPr/>
     </dgm:pt>
     <dgm:pt modelId="{34357CFD-625E-6042-B8ED-8D2936422A4C}" type="pres">
@@ -1256,7 +1256,7 @@
       <dgm:spPr/>
     </dgm:pt>
     <dgm:pt modelId="{BEC9298C-7E5D-994D-A404-AFE96BC23D20}" type="pres">
-      <dgm:prSet presAssocID="{509E18D3-B717-6044-9191-71FE23E0F7AF}" presName="sibTrans" presStyleLbl="sibTrans2D1" presStyleIdx="4" presStyleCnt="6"/>
+      <dgm:prSet presAssocID="{509E18D3-B717-6044-9191-71FE23E0F7AF}" presName="sibTrans" presStyleLbl="sibTrans2D1" presStyleIdx="4" presStyleCnt="6" custScaleX="149538"/>
       <dgm:spPr/>
     </dgm:pt>
     <dgm:pt modelId="{CAC1CB59-86FC-8341-81F6-1EFE079E0991}" type="pres">
@@ -1272,7 +1272,7 @@
       <dgm:spPr/>
     </dgm:pt>
     <dgm:pt modelId="{43323FF5-A52F-BD4D-9B83-192C296C9A70}" type="pres">
-      <dgm:prSet presAssocID="{B208A4CA-B789-2348-94E9-6B5901215803}" presName="sibTrans" presStyleLbl="sibTrans2D1" presStyleIdx="5" presStyleCnt="6" custScaleX="154977" custLinFactNeighborX="-55696" custLinFactNeighborY="-1039"/>
+      <dgm:prSet presAssocID="{B208A4CA-B789-2348-94E9-6B5901215803}" presName="sibTrans" presStyleLbl="sibTrans2D1" presStyleIdx="5" presStyleCnt="6" custAng="75379" custScaleX="158897" custScaleY="127054" custLinFactNeighborX="-55696" custLinFactNeighborY="1739"/>
       <dgm:spPr/>
     </dgm:pt>
     <dgm:pt modelId="{E61158FC-F3AE-FB44-B2D7-5DE977003E3A}" type="pres">
@@ -1280,7 +1280,7 @@
       <dgm:spPr/>
     </dgm:pt>
     <dgm:pt modelId="{245B2720-6610-584D-8394-050CD5577FDA}" type="pres">
-      <dgm:prSet presAssocID="{8EED9987-E9FA-604C-8611-F44631A82331}" presName="node" presStyleLbl="node1" presStyleIdx="6" presStyleCnt="7" custLinFactNeighborX="2712" custLinFactNeighborY="-46833">
+      <dgm:prSet presAssocID="{8EED9987-E9FA-604C-8611-F44631A82331}" presName="node" presStyleLbl="node1" presStyleIdx="6" presStyleCnt="7" custLinFactNeighborX="2712" custLinFactNeighborY="-44537">
         <dgm:presLayoutVars>
           <dgm:bulletEnabled val="1"/>
         </dgm:presLayoutVars>
@@ -1445,8 +1445,8 @@
       </dsp:nvSpPr>
       <dsp:spPr>
         <a:xfrm rot="24394">
-          <a:off x="3663429" y="1173999"/>
-          <a:ext cx="574595" cy="756480"/>
+          <a:off x="3496463" y="1173999"/>
+          <a:ext cx="908527" cy="756480"/>
         </a:xfrm>
         <a:prstGeom prst="rightArrow">
           <a:avLst>
@@ -1504,8 +1504,8 @@
         </a:p>
       </dsp:txBody>
       <dsp:txXfrm>
-        <a:off x="3663431" y="1324683"/>
-        <a:ext cx="402217" cy="453888"/>
+        <a:off x="3496466" y="1324490"/>
+        <a:ext cx="681583" cy="453888"/>
       </dsp:txXfrm>
     </dsp:sp>
     <dsp:sp modelId="{663401B1-6D1B-D642-92ED-2649C2D5B720}">
@@ -1603,8 +1603,8 @@
       </dsp:nvSpPr>
       <dsp:spPr>
         <a:xfrm rot="30879">
-          <a:off x="7767310" y="1206601"/>
-          <a:ext cx="500994" cy="756480"/>
+          <a:off x="7605111" y="1206601"/>
+          <a:ext cx="825392" cy="756480"/>
         </a:xfrm>
         <a:prstGeom prst="rightArrow">
           <a:avLst>
@@ -1662,8 +1662,8 @@
         </a:p>
       </dsp:txBody>
       <dsp:txXfrm>
-        <a:off x="7767313" y="1357222"/>
-        <a:ext cx="350696" cy="453888"/>
+        <a:off x="7605116" y="1356878"/>
+        <a:ext cx="598448" cy="453888"/>
       </dsp:txXfrm>
     </dsp:sp>
     <dsp:sp modelId="{83537806-DF59-C049-B960-98D722AB7BE0}">
@@ -1764,9 +1764,9 @@
         <dsp:cNvSpPr/>
       </dsp:nvSpPr>
       <dsp:spPr>
-        <a:xfrm rot="5285038">
-          <a:off x="9926061" y="2401471"/>
-          <a:ext cx="286142" cy="756480"/>
+        <a:xfrm rot="5400000">
+          <a:off x="9851119" y="2274159"/>
+          <a:ext cx="436026" cy="1011103"/>
         </a:xfrm>
         <a:prstGeom prst="rightArrow">
           <a:avLst>
@@ -1808,7 +1808,7 @@
         </a:bodyPr>
         <a:lstStyle/>
         <a:p>
-          <a:pPr marL="0" lvl="0" indent="0" algn="ctr" defTabSz="622300">
+          <a:pPr marL="0" lvl="0" indent="0" algn="ctr" defTabSz="800100">
             <a:lnSpc>
               <a:spcPct val="90000"/>
             </a:lnSpc>
@@ -1820,12 +1820,12 @@
             </a:spcAft>
             <a:buNone/>
           </a:pPr>
-          <a:endParaRPr lang="en-US" sz="1400" kern="1200"/>
+          <a:endParaRPr lang="en-US" sz="1800" kern="1200"/>
         </a:p>
       </dsp:txBody>
       <dsp:txXfrm rot="-5400000">
-        <a:off x="9840753" y="2636663"/>
-        <a:ext cx="453888" cy="200299"/>
+        <a:off x="9765802" y="2561697"/>
+        <a:ext cx="606661" cy="305218"/>
       </dsp:txXfrm>
     </dsp:sp>
     <dsp:sp modelId="{8408CF88-736B-FC4B-B92E-CD014A5465CD}">
@@ -1923,8 +1923,8 @@
       </dsp:nvSpPr>
       <dsp:spPr>
         <a:xfrm rot="10800000">
-          <a:off x="7815497" y="3594456"/>
-          <a:ext cx="542991" cy="756480"/>
+          <a:off x="7694849" y="3594456"/>
+          <a:ext cx="784285" cy="756480"/>
         </a:xfrm>
         <a:prstGeom prst="rightArrow">
           <a:avLst>
@@ -1982,8 +1982,8 @@
         </a:p>
       </dsp:txBody>
       <dsp:txXfrm rot="10800000">
-        <a:off x="7978394" y="3745752"/>
-        <a:ext cx="380094" cy="453888"/>
+        <a:off x="7921793" y="3745752"/>
+        <a:ext cx="557341" cy="453888"/>
       </dsp:txXfrm>
     </dsp:sp>
     <dsp:sp modelId="{FA538A98-5E19-2B4A-A438-8E4B260AD09E}">
@@ -2073,8 +2073,8 @@
       </dsp:nvSpPr>
       <dsp:spPr>
         <a:xfrm rot="10800000">
-          <a:off x="3642404" y="3594456"/>
-          <a:ext cx="612427" cy="756480"/>
+          <a:off x="3490711" y="3594456"/>
+          <a:ext cx="915811" cy="756480"/>
         </a:xfrm>
         <a:prstGeom prst="rightArrow">
           <a:avLst>
@@ -2132,8 +2132,8 @@
         </a:p>
       </dsp:txBody>
       <dsp:txXfrm rot="10800000">
-        <a:off x="3826132" y="3745752"/>
-        <a:ext cx="428699" cy="453888"/>
+        <a:off x="3717655" y="3745752"/>
+        <a:ext cx="688867" cy="453888"/>
       </dsp:txXfrm>
     </dsp:sp>
     <dsp:sp modelId="{E338C48A-CC63-244D-8384-855838AFBC70}">
@@ -2234,9 +2234,9 @@
         <dsp:cNvSpPr/>
       </dsp:nvSpPr>
       <dsp:spPr>
-        <a:xfrm rot="5323178">
-          <a:off x="1596455" y="4677746"/>
-          <a:ext cx="298230" cy="756480"/>
+        <a:xfrm rot="5400000">
+          <a:off x="1562569" y="4616812"/>
+          <a:ext cx="341167" cy="961138"/>
         </a:xfrm>
         <a:prstGeom prst="rightArrow">
           <a:avLst>
@@ -2278,7 +2278,7 @@
         </a:bodyPr>
         <a:lstStyle/>
         <a:p>
-          <a:pPr marL="0" lvl="0" indent="0" algn="ctr" defTabSz="622300">
+          <a:pPr marL="0" lvl="0" indent="0" algn="ctr" defTabSz="755650">
             <a:lnSpc>
               <a:spcPct val="90000"/>
             </a:lnSpc>
@@ -2290,12 +2290,12 @@
             </a:spcAft>
             <a:buNone/>
           </a:pPr>
-          <a:endParaRPr lang="en-US" sz="1400" kern="1200"/>
+          <a:endParaRPr lang="en-US" sz="1700" kern="1200"/>
         </a:p>
       </dsp:txBody>
       <dsp:txXfrm rot="-5400000">
-        <a:off x="1517627" y="4906882"/>
-        <a:ext cx="453888" cy="208761"/>
+        <a:off x="1444812" y="4926797"/>
+        <a:ext cx="576682" cy="238817"/>
       </dsp:txXfrm>
     </dsp:sp>
     <dsp:sp modelId="{245B2720-6610-584D-8394-050CD5577FDA}">
@@ -2305,7 +2305,7 @@
       </dsp:nvSpPr>
       <dsp:spPr>
         <a:xfrm>
-          <a:off x="352219" y="5250788"/>
+          <a:off x="352219" y="5292809"/>
           <a:ext cx="3050322" cy="1830193"/>
         </a:xfrm>
         <a:prstGeom prst="roundRect">
@@ -2379,7 +2379,7 @@
         </a:p>
       </dsp:txBody>
       <dsp:txXfrm>
-        <a:off x="405824" y="5304393"/>
+        <a:off x="405824" y="5346414"/>
         <a:ext cx="2943112" cy="1722983"/>
       </dsp:txXfrm>
     </dsp:sp>
@@ -3739,7 +3739,7 @@
           <a:p>
             <a:fld id="{1B8FF4D1-E0FB-F44A-826F-69D32C50BC85}" type="datetimeFigureOut">
               <a:rPr lang="en-US" smtClean="0"/>
-              <a:t>2/6/22</a:t>
+              <a:t>2/10/22</a:t>
             </a:fld>
             <a:endParaRPr lang="en-US"/>
           </a:p>
@@ -3937,7 +3937,7 @@
           <a:p>
             <a:fld id="{1B8FF4D1-E0FB-F44A-826F-69D32C50BC85}" type="datetimeFigureOut">
               <a:rPr lang="en-US" smtClean="0"/>
-              <a:t>2/6/22</a:t>
+              <a:t>2/10/22</a:t>
             </a:fld>
             <a:endParaRPr lang="en-US"/>
           </a:p>
@@ -4145,7 +4145,7 @@
           <a:p>
             <a:fld id="{1B8FF4D1-E0FB-F44A-826F-69D32C50BC85}" type="datetimeFigureOut">
               <a:rPr lang="en-US" smtClean="0"/>
-              <a:t>2/6/22</a:t>
+              <a:t>2/10/22</a:t>
             </a:fld>
             <a:endParaRPr lang="en-US"/>
           </a:p>
@@ -4343,7 +4343,7 @@
           <a:p>
             <a:fld id="{1B8FF4D1-E0FB-F44A-826F-69D32C50BC85}" type="datetimeFigureOut">
               <a:rPr lang="en-US" smtClean="0"/>
-              <a:t>2/6/22</a:t>
+              <a:t>2/10/22</a:t>
             </a:fld>
             <a:endParaRPr lang="en-US"/>
           </a:p>
@@ -4618,7 +4618,7 @@
           <a:p>
             <a:fld id="{1B8FF4D1-E0FB-F44A-826F-69D32C50BC85}" type="datetimeFigureOut">
               <a:rPr lang="en-US" smtClean="0"/>
-              <a:t>2/6/22</a:t>
+              <a:t>2/10/22</a:t>
             </a:fld>
             <a:endParaRPr lang="en-US"/>
           </a:p>
@@ -4883,7 +4883,7 @@
           <a:p>
             <a:fld id="{1B8FF4D1-E0FB-F44A-826F-69D32C50BC85}" type="datetimeFigureOut">
               <a:rPr lang="en-US" smtClean="0"/>
-              <a:t>2/6/22</a:t>
+              <a:t>2/10/22</a:t>
             </a:fld>
             <a:endParaRPr lang="en-US"/>
           </a:p>
@@ -5295,7 +5295,7 @@
           <a:p>
             <a:fld id="{1B8FF4D1-E0FB-F44A-826F-69D32C50BC85}" type="datetimeFigureOut">
               <a:rPr lang="en-US" smtClean="0"/>
-              <a:t>2/6/22</a:t>
+              <a:t>2/10/22</a:t>
             </a:fld>
             <a:endParaRPr lang="en-US"/>
           </a:p>
@@ -5436,7 +5436,7 @@
           <a:p>
             <a:fld id="{1B8FF4D1-E0FB-F44A-826F-69D32C50BC85}" type="datetimeFigureOut">
               <a:rPr lang="en-US" smtClean="0"/>
-              <a:t>2/6/22</a:t>
+              <a:t>2/10/22</a:t>
             </a:fld>
             <a:endParaRPr lang="en-US"/>
           </a:p>
@@ -5549,7 +5549,7 @@
           <a:p>
             <a:fld id="{1B8FF4D1-E0FB-F44A-826F-69D32C50BC85}" type="datetimeFigureOut">
               <a:rPr lang="en-US" smtClean="0"/>
-              <a:t>2/6/22</a:t>
+              <a:t>2/10/22</a:t>
             </a:fld>
             <a:endParaRPr lang="en-US"/>
           </a:p>
@@ -5860,7 +5860,7 @@
           <a:p>
             <a:fld id="{1B8FF4D1-E0FB-F44A-826F-69D32C50BC85}" type="datetimeFigureOut">
               <a:rPr lang="en-US" smtClean="0"/>
-              <a:t>2/6/22</a:t>
+              <a:t>2/10/22</a:t>
             </a:fld>
             <a:endParaRPr lang="en-US"/>
           </a:p>
@@ -6148,7 +6148,7 @@
           <a:p>
             <a:fld id="{1B8FF4D1-E0FB-F44A-826F-69D32C50BC85}" type="datetimeFigureOut">
               <a:rPr lang="en-US" smtClean="0"/>
-              <a:t>2/6/22</a:t>
+              <a:t>2/10/22</a:t>
             </a:fld>
             <a:endParaRPr lang="en-US"/>
           </a:p>
@@ -6389,7 +6389,7 @@
           <a:p>
             <a:fld id="{1B8FF4D1-E0FB-F44A-826F-69D32C50BC85}" type="datetimeFigureOut">
               <a:rPr lang="en-US" smtClean="0"/>
-              <a:t>2/6/22</a:t>
+              <a:t>2/10/22</a:t>
             </a:fld>
             <a:endParaRPr lang="en-US"/>
           </a:p>
@@ -6849,13 +6849,13 @@
           <p:nvPr>
             <p:extLst>
               <p:ext uri="{D42A27DB-BD31-4B8C-83A1-F6EECF244321}">
-                <p14:modId xmlns:p14="http://schemas.microsoft.com/office/powerpoint/2010/main" val="3524457435"/>
+                <p14:modId xmlns:p14="http://schemas.microsoft.com/office/powerpoint/2010/main" val="19389741"/>
               </p:ext>
             </p:extLst>
           </p:nvPr>
         </p:nvGraphicFramePr>
         <p:xfrm>
-          <a:off x="61785" y="-296562"/>
+          <a:off x="82806" y="-296562"/>
           <a:ext cx="12130215" cy="7945394"/>
         </p:xfrm>
         <a:graphic>

</xml_diff>